<commit_message>
Ajustes página principal para publicación
</commit_message>
<xml_diff>
--- a/Documentacion/Cartilla CDC_final.pptx
+++ b/Documentacion/Cartilla CDC_final.pptx
@@ -246,7 +246,7 @@
           <a:p>
             <a:fld id="{65A90203-494A-4DE2-9094-0C8F67580B2A}" type="datetimeFigureOut">
               <a:rPr lang="es-CO" smtClean="0"/>
-              <a:t>6/05/2019</a:t>
+              <a:t>11/05/19</a:t>
             </a:fld>
             <a:endParaRPr lang="es-CO"/>
           </a:p>
@@ -415,7 +415,7 @@
           <a:p>
             <a:fld id="{A84C9EAE-D7B5-4991-BB65-FBF16C4E8076}" type="datetimeFigureOut">
               <a:rPr lang="es-CO" smtClean="0"/>
-              <a:t>6/05/2019</a:t>
+              <a:t>11/05/19</a:t>
             </a:fld>
             <a:endParaRPr lang="es-CO"/>
           </a:p>
@@ -1321,7 +1321,7 @@
           <a:p>
             <a:fld id="{1B3984F9-9983-4AFC-82C8-163B93F3D507}" type="datetime1">
               <a:rPr lang="es-CO" smtClean="0"/>
-              <a:t>6/05/2019</a:t>
+              <a:t>11/05/19</a:t>
             </a:fld>
             <a:endParaRPr lang="es-CO"/>
           </a:p>
@@ -1503,7 +1503,7 @@
           <a:p>
             <a:fld id="{9ADE8553-B966-42A0-A67E-2DCC3AFB5D3E}" type="datetime1">
               <a:rPr lang="es-CO" smtClean="0"/>
-              <a:t>6/05/2019</a:t>
+              <a:t>11/05/19</a:t>
             </a:fld>
             <a:endParaRPr lang="es-CO"/>
           </a:p>
@@ -1695,7 +1695,7 @@
           <a:p>
             <a:fld id="{8CC9C51A-95A2-433B-B914-A75194379FB9}" type="datetime1">
               <a:rPr lang="es-CO" smtClean="0"/>
-              <a:t>6/05/2019</a:t>
+              <a:t>11/05/19</a:t>
             </a:fld>
             <a:endParaRPr lang="es-CO"/>
           </a:p>
@@ -1877,7 +1877,7 @@
           <a:p>
             <a:fld id="{E6940AEF-BA8B-4332-A114-EB4F917EDEC6}" type="datetime1">
               <a:rPr lang="es-CO" smtClean="0"/>
-              <a:t>6/05/2019</a:t>
+              <a:t>11/05/19</a:t>
             </a:fld>
             <a:endParaRPr lang="es-CO"/>
           </a:p>
@@ -2135,7 +2135,7 @@
           <a:p>
             <a:fld id="{9B8F5FE4-6E6F-4FEB-A5A2-BD28F11395FE}" type="datetime1">
               <a:rPr lang="es-CO" smtClean="0"/>
-              <a:t>6/05/2019</a:t>
+              <a:t>11/05/19</a:t>
             </a:fld>
             <a:endParaRPr lang="es-CO"/>
           </a:p>
@@ -2379,7 +2379,7 @@
           <a:p>
             <a:fld id="{29AE4F37-10BA-4EBF-A8DA-613F9E292EA9}" type="datetime1">
               <a:rPr lang="es-CO" smtClean="0"/>
-              <a:t>6/05/2019</a:t>
+              <a:t>11/05/19</a:t>
             </a:fld>
             <a:endParaRPr lang="es-CO"/>
           </a:p>
@@ -2758,7 +2758,7 @@
           <a:p>
             <a:fld id="{A66F144F-1582-476A-991A-CD2A70320440}" type="datetime1">
               <a:rPr lang="es-CO" smtClean="0"/>
-              <a:t>6/05/2019</a:t>
+              <a:t>11/05/19</a:t>
             </a:fld>
             <a:endParaRPr lang="es-CO"/>
           </a:p>
@@ -2888,7 +2888,7 @@
           <a:p>
             <a:fld id="{1185A9FA-ABB4-43D9-B418-E92CC2E8B075}" type="datetime1">
               <a:rPr lang="es-CO" smtClean="0"/>
-              <a:t>6/05/2019</a:t>
+              <a:t>11/05/19</a:t>
             </a:fld>
             <a:endParaRPr lang="es-CO"/>
           </a:p>
@@ -2995,7 +2995,7 @@
           <a:p>
             <a:fld id="{651DD38D-480D-4C4B-BE0E-44E38FFA4676}" type="datetime1">
               <a:rPr lang="es-CO" smtClean="0"/>
-              <a:t>6/05/2019</a:t>
+              <a:t>11/05/19</a:t>
             </a:fld>
             <a:endParaRPr lang="es-CO"/>
           </a:p>
@@ -3284,7 +3284,7 @@
           <a:p>
             <a:fld id="{06326E92-DFFC-4786-BA76-EA150EF449F7}" type="datetime1">
               <a:rPr lang="es-CO" smtClean="0"/>
-              <a:t>6/05/2019</a:t>
+              <a:t>11/05/19</a:t>
             </a:fld>
             <a:endParaRPr lang="es-CO"/>
           </a:p>
@@ -3549,7 +3549,7 @@
           <a:p>
             <a:fld id="{0F7BE4B4-F8D5-46F5-90C6-63C847A0DC1C}" type="datetime1">
               <a:rPr lang="es-CO" smtClean="0"/>
-              <a:t>6/05/2019</a:t>
+              <a:t>11/05/19</a:t>
             </a:fld>
             <a:endParaRPr lang="es-CO"/>
           </a:p>
@@ -3774,7 +3774,7 @@
           <a:p>
             <a:fld id="{E59E585B-F070-46A1-B7F0-DCCAC1184DCA}" type="datetime1">
               <a:rPr lang="es-CO" smtClean="0"/>
-              <a:t>6/05/2019</a:t>
+              <a:t>11/05/19</a:t>
             </a:fld>
             <a:endParaRPr lang="es-CO"/>
           </a:p>
@@ -4674,8 +4674,8 @@
         </p:blipFill>
         <p:spPr>
           <a:xfrm>
-            <a:off x="7502686" y="-116417"/>
-            <a:ext cx="4168613" cy="1335889"/>
+            <a:off x="7571677" y="36087"/>
+            <a:ext cx="3626057" cy="1162020"/>
           </a:xfrm>
           <a:prstGeom prst="rect">
             <a:avLst/>
@@ -5825,7 +5825,7 @@
           <a:noFill/>
           <a:extLst>
             <a:ext uri="{909E8E84-426E-40dd-AFC4-6F175D3DCCD1}">
-              <a14:hiddenFill xmlns="" xmlns:a14="http://schemas.microsoft.com/office/drawing/2010/main">
+              <a14:hiddenFill xmlns:a14="http://schemas.microsoft.com/office/drawing/2010/main" xmlns="">
                 <a:solidFill>
                   <a:srgbClr val="FFFFFF"/>
                 </a:solidFill>
@@ -5866,7 +5866,7 @@
           <a:noFill/>
           <a:extLst>
             <a:ext uri="{909E8E84-426E-40dd-AFC4-6F175D3DCCD1}">
-              <a14:hiddenFill xmlns="" xmlns:a14="http://schemas.microsoft.com/office/drawing/2010/main">
+              <a14:hiddenFill xmlns:a14="http://schemas.microsoft.com/office/drawing/2010/main" xmlns="">
                 <a:solidFill>
                   <a:srgbClr val="FFFFFF"/>
                 </a:solidFill>
@@ -19046,7 +19046,7 @@
         </p:nvSpPr>
         <p:spPr>
           <a:xfrm>
-            <a:off x="0" y="0"/>
+            <a:off x="-662152" y="0"/>
             <a:ext cx="12192000" cy="1295530"/>
           </a:xfrm>
           <a:prstGeom prst="rect">
@@ -27606,7 +27606,7 @@
         </p:blipFill>
         <p:spPr>
           <a:xfrm>
-            <a:off x="6953250" y="137580"/>
+            <a:off x="6953250" y="148091"/>
             <a:ext cx="4826000" cy="1026112"/>
           </a:xfrm>
           <a:prstGeom prst="rect">

</xml_diff>